<commit_message>
make the bash black out
</commit_message>
<xml_diff>
--- a/AIW Cloud Native.pptx
+++ b/AIW Cloud Native.pptx
@@ -2530,7 +2530,7 @@
                   <a:prstClr val="black"/>
                 </a:solidFill>
               </a:rPr>
-              <a:t>5/31/2021 2:12 PM</a:t>
+              <a:t>5/31/2021 2:18 PM</a:t>
             </a:fld>
             <a:endParaRPr lang="en-US" dirty="0">
               <a:solidFill>
@@ -19499,36 +19499,6 @@
       </p:grpSpPr>
       <p:pic>
         <p:nvPicPr>
-          <p:cNvPr id="5" name="Picture 4">
-            <a:extLst>
-              <a:ext uri="{FF2B5EF4-FFF2-40B4-BE49-F238E27FC236}">
-                <a16:creationId xmlns:a16="http://schemas.microsoft.com/office/drawing/2014/main" id="{BF521D63-4301-4E03-A787-D37B6EB770F6}"/>
-              </a:ext>
-            </a:extLst>
-          </p:cNvPr>
-          <p:cNvPicPr>
-            <a:picLocks noChangeAspect="1"/>
-          </p:cNvPicPr>
-          <p:nvPr/>
-        </p:nvPicPr>
-        <p:blipFill>
-          <a:blip r:embed="rId2"/>
-          <a:stretch>
-            <a:fillRect/>
-          </a:stretch>
-        </p:blipFill>
-        <p:spPr>
-          <a:xfrm>
-            <a:off x="139814" y="197567"/>
-            <a:ext cx="5639587" cy="2457793"/>
-          </a:xfrm>
-          <a:prstGeom prst="rect">
-            <a:avLst/>
-          </a:prstGeom>
-        </p:spPr>
-      </p:pic>
-      <p:pic>
-        <p:nvPicPr>
           <p:cNvPr id="9" name="Picture 8">
             <a:extLst>
               <a:ext uri="{FF2B5EF4-FFF2-40B4-BE49-F238E27FC236}">
@@ -19542,7 +19512,7 @@
           <p:nvPr/>
         </p:nvPicPr>
         <p:blipFill>
-          <a:blip r:embed="rId3"/>
+          <a:blip r:embed="rId2"/>
           <a:stretch>
             <a:fillRect/>
           </a:stretch>
@@ -19572,7 +19542,7 @@
           <p:nvPr/>
         </p:nvPicPr>
         <p:blipFill>
-          <a:blip r:embed="rId4"/>
+          <a:blip r:embed="rId3"/>
           <a:stretch>
             <a:fillRect/>
           </a:stretch>
@@ -19581,6 +19551,36 @@
           <a:xfrm>
             <a:off x="6095999" y="4331802"/>
             <a:ext cx="5830114" cy="2429214"/>
+          </a:xfrm>
+          <a:prstGeom prst="rect">
+            <a:avLst/>
+          </a:prstGeom>
+        </p:spPr>
+      </p:pic>
+      <p:pic>
+        <p:nvPicPr>
+          <p:cNvPr id="3" name="Picture 2">
+            <a:extLst>
+              <a:ext uri="{FF2B5EF4-FFF2-40B4-BE49-F238E27FC236}">
+                <a16:creationId xmlns:a16="http://schemas.microsoft.com/office/drawing/2014/main" id="{7F25484D-3EF0-4E27-9437-B15FD93BB237}"/>
+              </a:ext>
+            </a:extLst>
+          </p:cNvPr>
+          <p:cNvPicPr>
+            <a:picLocks noChangeAspect="1"/>
+          </p:cNvPicPr>
+          <p:nvPr/>
+        </p:nvPicPr>
+        <p:blipFill>
+          <a:blip r:embed="rId4"/>
+          <a:stretch>
+            <a:fillRect/>
+          </a:stretch>
+        </p:blipFill>
+        <p:spPr>
+          <a:xfrm>
+            <a:off x="230076" y="234733"/>
+            <a:ext cx="5118914" cy="2131096"/>
           </a:xfrm>
           <a:prstGeom prst="rect">
             <a:avLst/>

</xml_diff>

<commit_message>
add link to the case study on github
</commit_message>
<xml_diff>
--- a/AIW Cloud Native.pptx
+++ b/AIW Cloud Native.pptx
@@ -250,7 +250,7 @@
           <a:p>
             <a:fld id="{52A13B17-C506-4D51-BB37-16B365906619}" type="datetimeFigureOut">
               <a:rPr lang="en-US" smtClean="0"/>
-              <a:t>5/31/2021</a:t>
+              <a:t>6/1/2021</a:t>
             </a:fld>
             <a:endParaRPr lang="en-US" dirty="0"/>
           </a:p>
@@ -3757,7 +3757,7 @@
                   <a:prstClr val="black"/>
                 </a:solidFill>
               </a:rPr>
-              <a:t>5/31/2021 5:06 PM</a:t>
+              <a:t>6/1/2021 12:30 AM</a:t>
             </a:fld>
             <a:endParaRPr lang="en-US" dirty="0">
               <a:solidFill>
@@ -17302,10 +17302,10 @@
       </p:sp>
       <p:sp>
         <p:nvSpPr>
-          <p:cNvPr id="9" name="TextBox 8">
+          <p:cNvPr id="3" name="TextBox 2">
             <a:extLst>
               <a:ext uri="{FF2B5EF4-FFF2-40B4-BE49-F238E27FC236}">
-                <a16:creationId xmlns:a16="http://schemas.microsoft.com/office/drawing/2014/main" id="{0F86F9F9-39B5-4CE6-AF48-9ADAE40EA728}"/>
+                <a16:creationId xmlns:a16="http://schemas.microsoft.com/office/drawing/2014/main" id="{8670F53F-2D7F-4DE6-B768-2F20DFEDBF96}"/>
               </a:ext>
             </a:extLst>
           </p:cNvPr>
@@ -17314,8 +17314,8 @@
         </p:nvSpPr>
         <p:spPr>
           <a:xfrm>
-            <a:off x="340285" y="1741246"/>
-            <a:ext cx="7247965" cy="1203406"/>
+            <a:off x="1" y="3429000"/>
+            <a:ext cx="12192000" cy="738664"/>
           </a:xfrm>
           <a:prstGeom prst="rect">
             <a:avLst/>
@@ -17328,7 +17328,7 @@
           </a:bodyPr>
           <a:lstStyle/>
           <a:p>
-            <a:pPr>
+            <a:pPr algn="ctr">
               <a:lnSpc>
                 <a:spcPct val="90000"/>
               </a:lnSpc>
@@ -17337,31 +17337,155 @@
               </a:spcAft>
             </a:pPr>
             <a:r>
-              <a:rPr lang="en-US" sz="3600" dirty="0">
-                <a:latin typeface="+mj-lt"/>
-              </a:rPr>
-              <a:t>Outcome</a:t>
-            </a:r>
-          </a:p>
-          <a:p>
-            <a:pPr>
-              <a:lnSpc>
-                <a:spcPct val="90000"/>
-              </a:lnSpc>
-              <a:spcAft>
-                <a:spcPts val="600"/>
-              </a:spcAft>
-            </a:pPr>
-            <a:r>
-              <a:rPr lang="en-US" sz="2400" dirty="0">
+              <a:rPr lang="en-US" sz="3200" dirty="0">
                 <a:latin typeface="Segoe UI Semilight" panose="020B0402040204020203" pitchFamily="34" charset="0"/>
                 <a:cs typeface="Segoe UI Semilight" panose="020B0402040204020203" pitchFamily="34" charset="0"/>
               </a:rPr>
-              <a:t>Analyze your customer needs.</a:t>
+              <a:t> bit.ly/aiw-cloudnative-case</a:t>
             </a:r>
           </a:p>
         </p:txBody>
       </p:sp>
+      <p:pic>
+        <p:nvPicPr>
+          <p:cNvPr id="5" name="Picture 4">
+            <a:extLst>
+              <a:ext uri="{FF2B5EF4-FFF2-40B4-BE49-F238E27FC236}">
+                <a16:creationId xmlns:a16="http://schemas.microsoft.com/office/drawing/2014/main" id="{CC45ABA3-6490-45F0-B75A-2EAC4CF1464F}"/>
+              </a:ext>
+            </a:extLst>
+          </p:cNvPr>
+          <p:cNvPicPr>
+            <a:picLocks noChangeAspect="1"/>
+          </p:cNvPicPr>
+          <p:nvPr/>
+        </p:nvPicPr>
+        <p:blipFill>
+          <a:blip r:embed="rId3" cstate="print">
+            <a:lum bright="70000" contrast="-70000"/>
+            <a:extLst>
+              <a:ext uri="{BEBA8EAE-BF5A-486C-A8C5-ECC9F3942E4B}">
+                <a14:imgProps xmlns:a14="http://schemas.microsoft.com/office/drawing/2010/main">
+                  <a14:imgLayer r:embed="rId4">
+                    <a14:imgEffect>
+                      <a14:backgroundRemoval t="2667" b="96889" l="9778" r="89778">
+                        <a14:foregroundMark x1="10667" y1="11111" x2="10667" y2="11111"/>
+                        <a14:foregroundMark x1="10667" y1="11111" x2="12889" y2="6222"/>
+                        <a14:foregroundMark x1="16000" y1="5778" x2="54222" y2="3111"/>
+                        <a14:foregroundMark x1="50222" y1="4889" x2="80889" y2="13778"/>
+                        <a14:foregroundMark x1="84652" y1="56040" x2="86667" y2="78667"/>
+                        <a14:foregroundMark x1="83224" y1="40000" x2="83309" y2="40956"/>
+                        <a14:foregroundMark x1="83107" y1="38688" x2="83224" y2="40000"/>
+                        <a14:foregroundMark x1="82829" y1="35556" x2="82858" y2="35886"/>
+                        <a14:foregroundMark x1="82789" y1="35111" x2="82829" y2="35556"/>
+                        <a14:foregroundMark x1="82749" y1="34667" x2="82789" y2="35111"/>
+                        <a14:foregroundMark x1="82670" y1="33778" x2="82749" y2="34667"/>
+                        <a14:foregroundMark x1="82630" y1="33333" x2="82670" y2="33778"/>
+                        <a14:foregroundMark x1="81593" y1="21688" x2="82630" y2="33333"/>
+                        <a14:foregroundMark x1="80889" y1="13778" x2="81150" y2="16704"/>
+                        <a14:foregroundMark x1="48274" y1="91699" x2="48100" y2="91758"/>
+                        <a14:foregroundMark x1="86667" y1="78667" x2="85974" y2="78902"/>
+                        <a14:foregroundMark x1="13719" y1="80889" x2="12889" y2="5333"/>
+                        <a14:foregroundMark x1="88239" y1="36000" x2="88444" y2="36889"/>
+                        <a14:foregroundMark x1="88137" y1="35556" x2="88239" y2="36000"/>
+                        <a14:foregroundMark x1="88034" y1="35111" x2="88137" y2="35556"/>
+                        <a14:foregroundMark x1="87932" y1="34667" x2="88034" y2="35111"/>
+                        <a14:foregroundMark x1="87727" y1="33778" x2="87932" y2="34667"/>
+                        <a14:foregroundMark x1="87624" y1="33333" x2="87727" y2="33778"/>
+                        <a14:foregroundMark x1="85778" y1="25333" x2="87624" y2="33333"/>
+                        <a14:foregroundMark x1="65810" y1="18222" x2="61778" y2="16000"/>
+                        <a14:foregroundMark x1="66872" y1="18807" x2="65810" y2="18222"/>
+                        <a14:foregroundMark x1="67550" y1="19180" x2="67216" y2="18996"/>
+                        <a14:foregroundMark x1="83556" y1="28000" x2="79128" y2="25560"/>
+                        <a14:foregroundMark x1="61778" y1="16000" x2="61778" y2="6667"/>
+                        <a14:foregroundMark x1="60283" y1="20000" x2="60444" y2="23556"/>
+                        <a14:foregroundMark x1="60263" y1="19556" x2="60283" y2="20000"/>
+                        <a14:foregroundMark x1="60202" y1="18222" x2="60263" y2="19556"/>
+                        <a14:foregroundMark x1="60000" y1="13778" x2="60202" y2="18222"/>
+                        <a14:foregroundMark x1="61333" y1="20444" x2="62667" y2="28444"/>
+                        <a14:foregroundMark x1="65671" y1="27236" x2="68677" y2="27362"/>
+                        <a14:foregroundMark x1="62667" y1="27111" x2="65512" y2="27230"/>
+                        <a14:foregroundMark x1="78743" y1="28924" x2="81333" y2="29333"/>
+                        <a14:foregroundMark x1="88889" y1="79111" x2="87556" y2="92889"/>
+                        <a14:foregroundMark x1="87111" y1="92000" x2="64889" y2="96889"/>
+                        <a14:foregroundMark x1="64889" y1="96889" x2="45796" y2="95457"/>
+                        <a14:foregroundMark x1="16957" y1="93821" x2="12444" y2="93333"/>
+                        <a14:foregroundMark x1="45333" y1="96889" x2="40460" y2="96362"/>
+                        <a14:foregroundMark x1="13333" y1="94222" x2="12444" y2="88000"/>
+                        <a14:foregroundMark x1="32889" y1="63556" x2="57333" y2="63556"/>
+                        <a14:foregroundMark x1="57333" y1="63556" x2="68444" y2="64444"/>
+                        <a14:foregroundMark x1="35111" y1="49333" x2="69641" y2="46838"/>
+                        <a14:foregroundMark x1="30222" y1="48444" x2="31556" y2="48000"/>
+                        <a14:foregroundMark x1="12889" y1="94667" x2="41333" y2="93333"/>
+                        <a14:foregroundMark x1="41333" y1="93333" x2="41333" y2="93333"/>
+                        <a14:foregroundMark x1="33778" y1="79556" x2="62667" y2="77778"/>
+                        <a14:foregroundMark x1="63111" y1="77778" x2="70222" y2="77778"/>
+                        <a14:foregroundMark x1="85778" y1="59556" x2="86222" y2="31556"/>
+                        <a14:backgroundMark x1="30222" y1="26222" x2="40000" y2="26667"/>
+                        <a14:backgroundMark x1="72000" y1="22667" x2="72000" y2="22667"/>
+                        <a14:backgroundMark x1="69333" y1="20000" x2="72889" y2="20444"/>
+                        <a14:backgroundMark x1="72889" y1="21778" x2="76444" y2="22667"/>
+                        <a14:backgroundMark x1="76000" y1="23111" x2="68000" y2="18222"/>
+                        <a14:backgroundMark x1="72889" y1="20000" x2="78667" y2="24000"/>
+                        <a14:backgroundMark x1="76000" y1="24889" x2="79556" y2="24889"/>
+                        <a14:backgroundMark x1="67556" y1="21778" x2="68444" y2="18222"/>
+                        <a14:backgroundMark x1="71556" y1="21333" x2="67111" y2="18222"/>
+                        <a14:backgroundMark x1="67111" y1="20000" x2="67111" y2="20000"/>
+                        <a14:backgroundMark x1="67111" y1="19556" x2="67111" y2="19556"/>
+                        <a14:backgroundMark x1="67111" y1="19556" x2="67111" y2="18667"/>
+                        <a14:backgroundMark x1="67556" y1="18222" x2="67556" y2="18222"/>
+                        <a14:backgroundMark x1="67556" y1="18222" x2="67556" y2="18222"/>
+                        <a14:backgroundMark x1="80000" y1="40000" x2="80000" y2="40000"/>
+                        <a14:backgroundMark x1="76889" y1="41333" x2="77778" y2="56444"/>
+                        <a14:backgroundMark x1="78222" y1="57333" x2="82667" y2="36444"/>
+                        <a14:backgroundMark x1="82667" y1="43111" x2="83556" y2="34222"/>
+                        <a14:backgroundMark x1="81333" y1="37778" x2="81333" y2="37778"/>
+                        <a14:backgroundMark x1="82667" y1="36000" x2="82667" y2="36000"/>
+                        <a14:backgroundMark x1="82667" y1="36000" x2="82667" y2="36000"/>
+                        <a14:backgroundMark x1="82667" y1="35556" x2="82667" y2="35556"/>
+                        <a14:backgroundMark x1="82667" y1="35111" x2="82667" y2="35111"/>
+                        <a14:backgroundMark x1="82667" y1="35111" x2="82667" y2="35111"/>
+                        <a14:backgroundMark x1="82667" y1="34667" x2="82667" y2="34667"/>
+                        <a14:backgroundMark x1="82222" y1="33778" x2="82222" y2="33778"/>
+                        <a14:backgroundMark x1="83111" y1="33333" x2="83111" y2="33333"/>
+                        <a14:backgroundMark x1="82667" y1="34667" x2="82667" y2="34667"/>
+                        <a14:backgroundMark x1="82667" y1="34667" x2="82667" y2="34667"/>
+                        <a14:backgroundMark x1="82667" y1="34667" x2="82667" y2="34667"/>
+                        <a14:backgroundMark x1="82667" y1="34667" x2="82667" y2="34667"/>
+                        <a14:backgroundMark x1="78222" y1="72444" x2="78667" y2="87556"/>
+                        <a14:backgroundMark x1="29869" y1="85936" x2="22667" y2="86222"/>
+                        <a14:backgroundMark x1="78667" y1="84000" x2="32718" y2="85823"/>
+                        <a14:backgroundMark x1="22667" y1="86222" x2="21778" y2="79111"/>
+                        <a14:backgroundMark x1="20889" y1="80889" x2="20889" y2="88048"/>
+                        <a14:backgroundMark x1="43405" y1="89982" x2="49333" y2="89778"/>
+                        <a14:backgroundMark x1="49333" y1="89778" x2="48444" y2="90667"/>
+                      </a14:backgroundRemoval>
+                    </a14:imgEffect>
+                    <a14:imgEffect>
+                      <a14:saturation sat="400000"/>
+                    </a14:imgEffect>
+                  </a14:imgLayer>
+                </a14:imgProps>
+              </a:ext>
+              <a:ext uri="{28A0092B-C50C-407E-A947-70E740481C1C}">
+                <a14:useLocalDpi xmlns:a14="http://schemas.microsoft.com/office/drawing/2010/main" val="0"/>
+              </a:ext>
+            </a:extLst>
+          </a:blip>
+          <a:stretch>
+            <a:fillRect/>
+          </a:stretch>
+        </p:blipFill>
+        <p:spPr>
+          <a:xfrm>
+            <a:off x="3326832" y="3641736"/>
+            <a:ext cx="313191" cy="313191"/>
+          </a:xfrm>
+          <a:prstGeom prst="rect">
+            <a:avLst/>
+          </a:prstGeom>
+        </p:spPr>
+      </p:pic>
     </p:spTree>
     <p:extLst>
       <p:ext uri="{BB962C8B-B14F-4D97-AF65-F5344CB8AC3E}">
@@ -19221,11 +19345,11 @@
   <p:clrMapOvr>
     <a:masterClrMapping/>
   </p:clrMapOvr>
-  <mc:AlternateContent xmlns:mc="http://schemas.openxmlformats.org/markup-compatibility/2006">
-    <mc:Choice xmlns:p14="http://schemas.microsoft.com/office/powerpoint/2010/main" Requires="p14">
+  <mc:AlternateContent xmlns:mc="http://schemas.openxmlformats.org/markup-compatibility/2006" xmlns:p14="http://schemas.microsoft.com/office/powerpoint/2010/main">
+    <mc:Choice Requires="p14">
       <p:transition p14:dur="0"/>
     </mc:Choice>
-    <mc:Fallback>
+    <mc:Fallback xmlns="">
       <p:transition/>
     </mc:Fallback>
   </mc:AlternateContent>

</xml_diff>

<commit_message>
add recap of gotchas
</commit_message>
<xml_diff>
--- a/AIW Cloud Native.pptx
+++ b/AIW Cloud Native.pptx
@@ -4128,7 +4128,7 @@
                   <a:prstClr val="black"/>
                 </a:solidFill>
               </a:rPr>
-              <a:t>9/27/2021 2:01 PM</a:t>
+              <a:t>9/27/2021 2:43 PM</a:t>
             </a:fld>
             <a:endParaRPr lang="en-US" dirty="0">
               <a:solidFill>
@@ -17464,7 +17464,7 @@
 </file>
 
 <file path=ppt/slides/slide18.xml><?xml version="1.0" encoding="utf-8"?>
-<p:sld xmlns:a="http://schemas.openxmlformats.org/drawingml/2006/main" xmlns:r="http://schemas.openxmlformats.org/officeDocument/2006/relationships" xmlns:p="http://schemas.openxmlformats.org/presentationml/2006/main" show="0">
+<p:sld xmlns:a="http://schemas.openxmlformats.org/drawingml/2006/main" xmlns:r="http://schemas.openxmlformats.org/officeDocument/2006/relationships" xmlns:p="http://schemas.openxmlformats.org/presentationml/2006/main">
   <p:cSld>
     <p:spTree>
       <p:nvGrpSpPr>
@@ -17511,7 +17511,7 @@
                 <a:latin typeface="Segoe UI Black" panose="020B0A02040204020203" pitchFamily="34" charset="0"/>
                 <a:ea typeface="Segoe UI Black" panose="020B0A02040204020203" pitchFamily="34" charset="0"/>
               </a:rPr>
-              <a:t>Whiteboard session</a:t>
+              <a:t>Case study</a:t>
             </a:r>
           </a:p>
         </p:txBody>
@@ -17783,11 +17783,11 @@
   <p:clrMapOvr>
     <a:masterClrMapping/>
   </p:clrMapOvr>
-  <mc:AlternateContent xmlns:mc="http://schemas.openxmlformats.org/markup-compatibility/2006">
-    <mc:Choice xmlns:p14="http://schemas.microsoft.com/office/powerpoint/2010/main" Requires="p14">
+  <mc:AlternateContent xmlns:mc="http://schemas.openxmlformats.org/markup-compatibility/2006" xmlns:p14="http://schemas.microsoft.com/office/powerpoint/2010/main">
+    <mc:Choice Requires="p14">
       <p:transition p14:dur="0"/>
     </mc:Choice>
-    <mc:Fallback>
+    <mc:Fallback xmlns="">
       <p:transition/>
     </mc:Fallback>
   </mc:AlternateContent>
@@ -21977,6 +21977,14 @@
 <file path=ppt/slides/slide46.xml><?xml version="1.0" encoding="utf-8"?>
 <p:sld xmlns:a="http://schemas.openxmlformats.org/drawingml/2006/main" xmlns:r="http://schemas.openxmlformats.org/officeDocument/2006/relationships" xmlns:p="http://schemas.openxmlformats.org/presentationml/2006/main">
   <p:cSld>
+    <p:bg>
+      <p:bgPr>
+        <a:solidFill>
+          <a:srgbClr val="0078D7"/>
+        </a:solidFill>
+        <a:effectLst/>
+      </p:bgPr>
+    </p:bg>
     <p:spTree>
       <p:nvGrpSpPr>
         <p:cNvPr id="1" name=""/>
@@ -22213,6 +22221,1120 @@
               </a:rPr>
               <a:t>LAB</a:t>
             </a:r>
+          </a:p>
+        </p:txBody>
+      </p:sp>
+      <p:sp>
+        <p:nvSpPr>
+          <p:cNvPr id="3" name="TextBox 2">
+            <a:extLst>
+              <a:ext uri="{FF2B5EF4-FFF2-40B4-BE49-F238E27FC236}">
+                <a16:creationId xmlns:a16="http://schemas.microsoft.com/office/drawing/2014/main" id="{9FCE60AD-6001-4077-B06F-E9621A4BAA20}"/>
+              </a:ext>
+            </a:extLst>
+          </p:cNvPr>
+          <p:cNvSpPr txBox="1"/>
+          <p:nvPr/>
+        </p:nvSpPr>
+        <p:spPr>
+          <a:xfrm>
+            <a:off x="515256" y="401334"/>
+            <a:ext cx="3570514" cy="1331428"/>
+          </a:xfrm>
+          <a:prstGeom prst="roundRect">
+            <a:avLst/>
+          </a:prstGeom>
+          <a:solidFill>
+            <a:srgbClr val="0078D7"/>
+          </a:solidFill>
+          <a:ln>
+            <a:noFill/>
+          </a:ln>
+        </p:spPr>
+        <p:style>
+          <a:lnRef idx="2">
+            <a:schemeClr val="accent4">
+              <a:shade val="50000"/>
+            </a:schemeClr>
+          </a:lnRef>
+          <a:fillRef idx="1">
+            <a:schemeClr val="accent4"/>
+          </a:fillRef>
+          <a:effectRef idx="0">
+            <a:schemeClr val="accent4"/>
+          </a:effectRef>
+          <a:fontRef idx="minor">
+            <a:schemeClr val="lt1"/>
+          </a:fontRef>
+        </p:style>
+        <p:txBody>
+          <a:bodyPr wrap="square" lIns="182880" tIns="146304" rIns="182880" bIns="146304" rtlCol="0">
+            <a:spAutoFit/>
+          </a:bodyPr>
+          <a:lstStyle/>
+          <a:p>
+            <a:pPr>
+              <a:lnSpc>
+                <a:spcPct val="90000"/>
+              </a:lnSpc>
+              <a:spcAft>
+                <a:spcPts val="600"/>
+              </a:spcAft>
+            </a:pPr>
+            <a:r>
+              <a:rPr lang="sv-SE" sz="2000" b="1" dirty="0">
+                <a:gradFill>
+                  <a:gsLst>
+                    <a:gs pos="2917">
+                      <a:schemeClr val="tx1"/>
+                    </a:gs>
+                    <a:gs pos="30000">
+                      <a:schemeClr val="tx1"/>
+                    </a:gs>
+                  </a:gsLst>
+                  <a:lin ang="5400000" scaled="0"/>
+                </a:gradFill>
+                <a:latin typeface="Segoe UI" panose="020B0502040204020203" pitchFamily="34" charset="0"/>
+                <a:cs typeface="Segoe UI" panose="020B0502040204020203" pitchFamily="34" charset="0"/>
+              </a:rPr>
+              <a:t>Environment</a:t>
+            </a:r>
+          </a:p>
+          <a:p>
+            <a:pPr>
+              <a:lnSpc>
+                <a:spcPct val="90000"/>
+              </a:lnSpc>
+              <a:spcAft>
+                <a:spcPts val="600"/>
+              </a:spcAft>
+            </a:pPr>
+            <a:r>
+              <a:rPr lang="en-US" sz="2000" b="1" dirty="0">
+                <a:ea typeface="Segoe UI Black" panose="020B0A02040204020203" pitchFamily="34" charset="0"/>
+              </a:rPr>
+              <a:t>URL    https://bit.ly/3lsVU3o</a:t>
+            </a:r>
+            <a:br>
+              <a:rPr lang="en-US" sz="2000" b="1" dirty="0">
+                <a:ea typeface="Segoe UI Black" panose="020B0A02040204020203" pitchFamily="34" charset="0"/>
+              </a:rPr>
+            </a:br>
+            <a:r>
+              <a:rPr lang="en-US" sz="2000" b="1" dirty="0">
+                <a:ea typeface="Segoe UI Black" panose="020B0A02040204020203" pitchFamily="34" charset="0"/>
+              </a:rPr>
+              <a:t>CODE </a:t>
+            </a:r>
+            <a:r>
+              <a:rPr lang="en-US" sz="2000" b="1" dirty="0"/>
+              <a:t>ACTIVATE17607</a:t>
+            </a:r>
+            <a:endParaRPr lang="sv-SE" sz="2000" dirty="0">
+              <a:gradFill>
+                <a:gsLst>
+                  <a:gs pos="2917">
+                    <a:schemeClr val="tx1"/>
+                  </a:gs>
+                  <a:gs pos="30000">
+                    <a:schemeClr val="tx1"/>
+                  </a:gs>
+                </a:gsLst>
+                <a:lin ang="5400000" scaled="0"/>
+              </a:gradFill>
+            </a:endParaRPr>
+          </a:p>
+        </p:txBody>
+      </p:sp>
+      <p:sp>
+        <p:nvSpPr>
+          <p:cNvPr id="5" name="TextBox 4">
+            <a:extLst>
+              <a:ext uri="{FF2B5EF4-FFF2-40B4-BE49-F238E27FC236}">
+                <a16:creationId xmlns:a16="http://schemas.microsoft.com/office/drawing/2014/main" id="{7389C175-5B98-4093-9863-122F1A0CB880}"/>
+              </a:ext>
+            </a:extLst>
+          </p:cNvPr>
+          <p:cNvSpPr txBox="1"/>
+          <p:nvPr/>
+        </p:nvSpPr>
+        <p:spPr>
+          <a:xfrm>
+            <a:off x="4489010" y="401334"/>
+            <a:ext cx="3551850" cy="1024961"/>
+          </a:xfrm>
+          <a:prstGeom prst="roundRect">
+            <a:avLst/>
+          </a:prstGeom>
+          <a:solidFill>
+            <a:srgbClr val="0078D7"/>
+          </a:solidFill>
+          <a:ln>
+            <a:noFill/>
+          </a:ln>
+        </p:spPr>
+        <p:style>
+          <a:lnRef idx="2">
+            <a:schemeClr val="accent4">
+              <a:shade val="50000"/>
+            </a:schemeClr>
+          </a:lnRef>
+          <a:fillRef idx="1">
+            <a:schemeClr val="accent4"/>
+          </a:fillRef>
+          <a:effectRef idx="0">
+            <a:schemeClr val="accent4"/>
+          </a:effectRef>
+          <a:fontRef idx="minor">
+            <a:schemeClr val="lt1"/>
+          </a:fontRef>
+        </p:style>
+        <p:txBody>
+          <a:bodyPr wrap="square" lIns="182880" tIns="146304" rIns="182880" bIns="146304" rtlCol="0">
+            <a:spAutoFit/>
+          </a:bodyPr>
+          <a:lstStyle/>
+          <a:p>
+            <a:pPr>
+              <a:lnSpc>
+                <a:spcPct val="90000"/>
+              </a:lnSpc>
+              <a:spcAft>
+                <a:spcPts val="600"/>
+              </a:spcAft>
+            </a:pPr>
+            <a:r>
+              <a:rPr lang="sv-SE" sz="2000" b="1" dirty="0">
+                <a:gradFill>
+                  <a:gsLst>
+                    <a:gs pos="2917">
+                      <a:schemeClr val="tx1"/>
+                    </a:gs>
+                    <a:gs pos="30000">
+                      <a:schemeClr val="tx1"/>
+                    </a:gs>
+                  </a:gsLst>
+                  <a:lin ang="5400000" scaled="0"/>
+                </a:gradFill>
+                <a:latin typeface="Segoe UI" panose="020B0502040204020203" pitchFamily="34" charset="0"/>
+                <a:cs typeface="Segoe UI" panose="020B0502040204020203" pitchFamily="34" charset="0"/>
+              </a:rPr>
+              <a:t>Page 1-2</a:t>
+            </a:r>
+          </a:p>
+          <a:p>
+            <a:pPr>
+              <a:lnSpc>
+                <a:spcPct val="90000"/>
+              </a:lnSpc>
+              <a:spcAft>
+                <a:spcPts val="600"/>
+              </a:spcAft>
+            </a:pPr>
+            <a:r>
+              <a:rPr lang="sv-SE" sz="2000" dirty="0">
+                <a:gradFill>
+                  <a:gsLst>
+                    <a:gs pos="2917">
+                      <a:schemeClr val="tx1"/>
+                    </a:gs>
+                    <a:gs pos="30000">
+                      <a:schemeClr val="tx1"/>
+                    </a:gs>
+                  </a:gsLst>
+                  <a:lin ang="5400000" scaled="0"/>
+                </a:gradFill>
+              </a:rPr>
+              <a:t>Paves the way for the lab</a:t>
+            </a:r>
+          </a:p>
+        </p:txBody>
+      </p:sp>
+      <p:sp>
+        <p:nvSpPr>
+          <p:cNvPr id="6" name="TextBox 5">
+            <a:extLst>
+              <a:ext uri="{FF2B5EF4-FFF2-40B4-BE49-F238E27FC236}">
+                <a16:creationId xmlns:a16="http://schemas.microsoft.com/office/drawing/2014/main" id="{27C34B7B-C894-41AF-AB1A-FF884BD6837E}"/>
+              </a:ext>
+            </a:extLst>
+          </p:cNvPr>
+          <p:cNvSpPr txBox="1"/>
+          <p:nvPr/>
+        </p:nvSpPr>
+        <p:spPr>
+          <a:xfrm>
+            <a:off x="8440059" y="401334"/>
+            <a:ext cx="3236685" cy="1723025"/>
+          </a:xfrm>
+          <a:prstGeom prst="roundRect">
+            <a:avLst/>
+          </a:prstGeom>
+          <a:solidFill>
+            <a:srgbClr val="0078D7"/>
+          </a:solidFill>
+          <a:ln>
+            <a:noFill/>
+          </a:ln>
+        </p:spPr>
+        <p:style>
+          <a:lnRef idx="2">
+            <a:schemeClr val="accent4">
+              <a:shade val="50000"/>
+            </a:schemeClr>
+          </a:lnRef>
+          <a:fillRef idx="1">
+            <a:schemeClr val="accent4"/>
+          </a:fillRef>
+          <a:effectRef idx="0">
+            <a:schemeClr val="accent4"/>
+          </a:effectRef>
+          <a:fontRef idx="minor">
+            <a:schemeClr val="lt1"/>
+          </a:fontRef>
+        </p:style>
+        <p:txBody>
+          <a:bodyPr wrap="square" lIns="182880" tIns="146304" rIns="182880" bIns="146304" rtlCol="0">
+            <a:spAutoFit/>
+          </a:bodyPr>
+          <a:lstStyle/>
+          <a:p>
+            <a:pPr>
+              <a:lnSpc>
+                <a:spcPct val="90000"/>
+              </a:lnSpc>
+              <a:spcAft>
+                <a:spcPts val="600"/>
+              </a:spcAft>
+            </a:pPr>
+            <a:r>
+              <a:rPr lang="sv-SE" sz="2000" b="1" dirty="0">
+                <a:gradFill>
+                  <a:gsLst>
+                    <a:gs pos="2917">
+                      <a:schemeClr val="tx1"/>
+                    </a:gs>
+                    <a:gs pos="30000">
+                      <a:schemeClr val="tx1"/>
+                    </a:gs>
+                  </a:gsLst>
+                  <a:lin ang="5400000" scaled="0"/>
+                </a:gradFill>
+                <a:latin typeface="Segoe UI" panose="020B0502040204020203" pitchFamily="34" charset="0"/>
+                <a:cs typeface="Segoe UI" panose="020B0502040204020203" pitchFamily="34" charset="0"/>
+              </a:rPr>
+              <a:t>Copy-paste</a:t>
+            </a:r>
+          </a:p>
+          <a:p>
+            <a:pPr>
+              <a:lnSpc>
+                <a:spcPct val="90000"/>
+              </a:lnSpc>
+              <a:spcAft>
+                <a:spcPts val="600"/>
+              </a:spcAft>
+            </a:pPr>
+            <a:r>
+              <a:rPr lang="sv-SE" sz="2000" dirty="0">
+                <a:gradFill>
+                  <a:gsLst>
+                    <a:gs pos="2917">
+                      <a:schemeClr val="tx1"/>
+                    </a:gs>
+                    <a:gs pos="30000">
+                      <a:schemeClr val="tx1"/>
+                    </a:gs>
+                  </a:gsLst>
+                  <a:lin ang="5400000" scaled="0"/>
+                </a:gradFill>
+              </a:rPr>
+              <a:t>Use copy icon to copy</a:t>
+            </a:r>
+          </a:p>
+          <a:p>
+            <a:pPr>
+              <a:lnSpc>
+                <a:spcPct val="90000"/>
+              </a:lnSpc>
+              <a:spcAft>
+                <a:spcPts val="600"/>
+              </a:spcAft>
+            </a:pPr>
+            <a:r>
+              <a:rPr lang="sv-SE" sz="2000" dirty="0">
+                <a:gradFill>
+                  <a:gsLst>
+                    <a:gs pos="2917">
+                      <a:schemeClr val="tx1"/>
+                    </a:gs>
+                    <a:gs pos="30000">
+                      <a:schemeClr val="tx1"/>
+                    </a:gs>
+                  </a:gsLst>
+                  <a:lin ang="5400000" scaled="0"/>
+                </a:gradFill>
+              </a:rPr>
+              <a:t>CTRL+Shift+V to paste (in cloud shell/terminal)</a:t>
+            </a:r>
+          </a:p>
+        </p:txBody>
+      </p:sp>
+      <p:sp>
+        <p:nvSpPr>
+          <p:cNvPr id="7" name="TextBox 6">
+            <a:extLst>
+              <a:ext uri="{FF2B5EF4-FFF2-40B4-BE49-F238E27FC236}">
+                <a16:creationId xmlns:a16="http://schemas.microsoft.com/office/drawing/2014/main" id="{DCA6E504-341B-4205-B523-076C68794495}"/>
+              </a:ext>
+            </a:extLst>
+          </p:cNvPr>
+          <p:cNvSpPr txBox="1"/>
+          <p:nvPr/>
+        </p:nvSpPr>
+        <p:spPr>
+          <a:xfrm>
+            <a:off x="4489010" y="1569282"/>
+            <a:ext cx="3570513" cy="2335959"/>
+          </a:xfrm>
+          <a:prstGeom prst="roundRect">
+            <a:avLst/>
+          </a:prstGeom>
+          <a:solidFill>
+            <a:srgbClr val="0078D7"/>
+          </a:solidFill>
+          <a:ln>
+            <a:noFill/>
+          </a:ln>
+        </p:spPr>
+        <p:style>
+          <a:lnRef idx="2">
+            <a:schemeClr val="accent4">
+              <a:shade val="50000"/>
+            </a:schemeClr>
+          </a:lnRef>
+          <a:fillRef idx="1">
+            <a:schemeClr val="accent4"/>
+          </a:fillRef>
+          <a:effectRef idx="0">
+            <a:schemeClr val="accent4"/>
+          </a:effectRef>
+          <a:fontRef idx="minor">
+            <a:schemeClr val="lt1"/>
+          </a:fontRef>
+        </p:style>
+        <p:txBody>
+          <a:bodyPr wrap="square" lIns="182880" tIns="146304" rIns="182880" bIns="146304" rtlCol="0">
+            <a:spAutoFit/>
+          </a:bodyPr>
+          <a:lstStyle/>
+          <a:p>
+            <a:pPr>
+              <a:lnSpc>
+                <a:spcPct val="90000"/>
+              </a:lnSpc>
+              <a:spcAft>
+                <a:spcPts val="600"/>
+              </a:spcAft>
+            </a:pPr>
+            <a:r>
+              <a:rPr lang="sv-SE" sz="2000" b="1" dirty="0">
+                <a:gradFill>
+                  <a:gsLst>
+                    <a:gs pos="2917">
+                      <a:schemeClr val="tx1"/>
+                    </a:gs>
+                    <a:gs pos="30000">
+                      <a:schemeClr val="tx1"/>
+                    </a:gs>
+                  </a:gsLst>
+                  <a:lin ang="5400000" scaled="0"/>
+                </a:gradFill>
+                <a:latin typeface="Segoe UI" panose="020B0502040204020203" pitchFamily="34" charset="0"/>
+                <a:cs typeface="Segoe UI" panose="020B0502040204020203" pitchFamily="34" charset="0"/>
+              </a:rPr>
+              <a:t>Don’t waste time on vim</a:t>
+            </a:r>
+          </a:p>
+          <a:p>
+            <a:pPr>
+              <a:lnSpc>
+                <a:spcPct val="90000"/>
+              </a:lnSpc>
+              <a:spcAft>
+                <a:spcPts val="600"/>
+              </a:spcAft>
+            </a:pPr>
+            <a:r>
+              <a:rPr lang="sv-SE" sz="2000" dirty="0">
+                <a:gradFill>
+                  <a:gsLst>
+                    <a:gs pos="2917">
+                      <a:schemeClr val="tx1"/>
+                    </a:gs>
+                    <a:gs pos="30000">
+                      <a:schemeClr val="tx1"/>
+                    </a:gs>
+                  </a:gsLst>
+                  <a:lin ang="5400000" scaled="0"/>
+                </a:gradFill>
+              </a:rPr>
+              <a:t>The browser hijacks your command shortcuts.</a:t>
+            </a:r>
+          </a:p>
+          <a:p>
+            <a:pPr>
+              <a:lnSpc>
+                <a:spcPct val="90000"/>
+              </a:lnSpc>
+              <a:spcAft>
+                <a:spcPts val="600"/>
+              </a:spcAft>
+            </a:pPr>
+            <a:r>
+              <a:rPr lang="sv-SE" sz="2000" dirty="0">
+                <a:gradFill>
+                  <a:gsLst>
+                    <a:gs pos="2917">
+                      <a:schemeClr val="tx1"/>
+                    </a:gs>
+                    <a:gs pos="30000">
+                      <a:schemeClr val="tx1"/>
+                    </a:gs>
+                  </a:gsLst>
+                  <a:lin ang="5400000" scaled="0"/>
+                </a:gradFill>
+              </a:rPr>
+              <a:t>Use nano (on ”Build Agent VM”) and code on the other machine.</a:t>
+            </a:r>
+          </a:p>
+        </p:txBody>
+      </p:sp>
+      <p:grpSp>
+        <p:nvGrpSpPr>
+          <p:cNvPr id="18" name="Group 17">
+            <a:extLst>
+              <a:ext uri="{FF2B5EF4-FFF2-40B4-BE49-F238E27FC236}">
+                <a16:creationId xmlns:a16="http://schemas.microsoft.com/office/drawing/2014/main" id="{B2FD7188-2D35-4ED0-8D50-1CDDC705070E}"/>
+              </a:ext>
+            </a:extLst>
+          </p:cNvPr>
+          <p:cNvGrpSpPr/>
+          <p:nvPr/>
+        </p:nvGrpSpPr>
+        <p:grpSpPr>
+          <a:xfrm>
+            <a:off x="8440059" y="2272602"/>
+            <a:ext cx="3236685" cy="2536569"/>
+            <a:chOff x="8273144" y="2468543"/>
+            <a:chExt cx="3570513" cy="2536569"/>
+          </a:xfrm>
+        </p:grpSpPr>
+        <p:sp>
+          <p:nvSpPr>
+            <p:cNvPr id="14" name="TextBox 13">
+              <a:extLst>
+                <a:ext uri="{FF2B5EF4-FFF2-40B4-BE49-F238E27FC236}">
+                  <a16:creationId xmlns:a16="http://schemas.microsoft.com/office/drawing/2014/main" id="{1A06CE76-633F-4907-A46C-DFA35A328A39}"/>
+                </a:ext>
+              </a:extLst>
+            </p:cNvPr>
+            <p:cNvSpPr txBox="1"/>
+            <p:nvPr/>
+          </p:nvSpPr>
+          <p:spPr>
+            <a:xfrm>
+              <a:off x="8273144" y="2468543"/>
+              <a:ext cx="3570513" cy="2536569"/>
+            </a:xfrm>
+            <a:prstGeom prst="roundRect">
+              <a:avLst/>
+            </a:prstGeom>
+            <a:solidFill>
+              <a:srgbClr val="0078D7"/>
+            </a:solidFill>
+            <a:ln>
+              <a:noFill/>
+            </a:ln>
+          </p:spPr>
+          <p:style>
+            <a:lnRef idx="2">
+              <a:schemeClr val="accent4">
+                <a:shade val="50000"/>
+              </a:schemeClr>
+            </a:lnRef>
+            <a:fillRef idx="1">
+              <a:schemeClr val="accent4"/>
+            </a:fillRef>
+            <a:effectRef idx="0">
+              <a:schemeClr val="accent4"/>
+            </a:effectRef>
+            <a:fontRef idx="minor">
+              <a:schemeClr val="lt1"/>
+            </a:fontRef>
+          </p:style>
+          <p:txBody>
+            <a:bodyPr wrap="square" lIns="182880" tIns="146304" rIns="182880" bIns="146304" rtlCol="0">
+              <a:noAutofit/>
+            </a:bodyPr>
+            <a:lstStyle/>
+            <a:p>
+              <a:pPr>
+                <a:lnSpc>
+                  <a:spcPct val="90000"/>
+                </a:lnSpc>
+                <a:spcAft>
+                  <a:spcPts val="600"/>
+                </a:spcAft>
+              </a:pPr>
+              <a:r>
+                <a:rPr lang="sv-SE" sz="2000" b="1" dirty="0">
+                  <a:gradFill>
+                    <a:gsLst>
+                      <a:gs pos="2917">
+                        <a:schemeClr val="tx1"/>
+                      </a:gs>
+                      <a:gs pos="30000">
+                        <a:schemeClr val="tx1"/>
+                      </a:gs>
+                    </a:gsLst>
+                    <a:lin ang="5400000" scaled="0"/>
+                  </a:gradFill>
+                  <a:latin typeface="Segoe UI" panose="020B0502040204020203" pitchFamily="34" charset="0"/>
+                  <a:cs typeface="Segoe UI" panose="020B0502040204020203" pitchFamily="34" charset="0"/>
+                </a:rPr>
+                <a:t>Blank cloud shell?</a:t>
+              </a:r>
+            </a:p>
+          </p:txBody>
+        </p:sp>
+        <p:pic>
+          <p:nvPicPr>
+            <p:cNvPr id="10" name="Picture 9">
+              <a:extLst>
+                <a:ext uri="{FF2B5EF4-FFF2-40B4-BE49-F238E27FC236}">
+                  <a16:creationId xmlns:a16="http://schemas.microsoft.com/office/drawing/2014/main" id="{C8D21A14-52EC-4CCB-A6CA-871F1D6077D2}"/>
+                </a:ext>
+              </a:extLst>
+            </p:cNvPr>
+            <p:cNvPicPr>
+              <a:picLocks noChangeAspect="1"/>
+            </p:cNvPicPr>
+            <p:nvPr/>
+          </p:nvPicPr>
+          <p:blipFill>
+            <a:blip r:embed="rId2"/>
+            <a:stretch>
+              <a:fillRect/>
+            </a:stretch>
+          </p:blipFill>
+          <p:spPr>
+            <a:xfrm>
+              <a:off x="8440059" y="3142907"/>
+              <a:ext cx="1418405" cy="590508"/>
+            </a:xfrm>
+            <a:prstGeom prst="rect">
+              <a:avLst/>
+            </a:prstGeom>
+          </p:spPr>
+        </p:pic>
+        <p:pic>
+          <p:nvPicPr>
+            <p:cNvPr id="8" name="Picture 7">
+              <a:extLst>
+                <a:ext uri="{FF2B5EF4-FFF2-40B4-BE49-F238E27FC236}">
+                  <a16:creationId xmlns:a16="http://schemas.microsoft.com/office/drawing/2014/main" id="{6FD42093-AD1B-4238-B030-6045FF020980}"/>
+                </a:ext>
+              </a:extLst>
+            </p:cNvPr>
+            <p:cNvPicPr>
+              <a:picLocks noChangeAspect="1"/>
+            </p:cNvPicPr>
+            <p:nvPr/>
+          </p:nvPicPr>
+          <p:blipFill>
+            <a:blip r:embed="rId3"/>
+            <a:stretch>
+              <a:fillRect/>
+            </a:stretch>
+          </p:blipFill>
+          <p:spPr>
+            <a:xfrm>
+              <a:off x="9034215" y="3606595"/>
+              <a:ext cx="1816087" cy="630879"/>
+            </a:xfrm>
+            <a:prstGeom prst="rect">
+              <a:avLst/>
+            </a:prstGeom>
+          </p:spPr>
+        </p:pic>
+        <p:pic>
+          <p:nvPicPr>
+            <p:cNvPr id="9" name="Picture 8">
+              <a:extLst>
+                <a:ext uri="{FF2B5EF4-FFF2-40B4-BE49-F238E27FC236}">
+                  <a16:creationId xmlns:a16="http://schemas.microsoft.com/office/drawing/2014/main" id="{06D6D39D-498D-4C69-802E-0640656CCFB3}"/>
+                </a:ext>
+              </a:extLst>
+            </p:cNvPr>
+            <p:cNvPicPr>
+              <a:picLocks noChangeAspect="1"/>
+            </p:cNvPicPr>
+            <p:nvPr/>
+          </p:nvPicPr>
+          <p:blipFill>
+            <a:blip r:embed="rId4"/>
+            <a:stretch>
+              <a:fillRect/>
+            </a:stretch>
+          </p:blipFill>
+          <p:spPr>
+            <a:xfrm>
+              <a:off x="10041805" y="4158955"/>
+              <a:ext cx="1615473" cy="673114"/>
+            </a:xfrm>
+            <a:prstGeom prst="rect">
+              <a:avLst/>
+            </a:prstGeom>
+          </p:spPr>
+        </p:pic>
+      </p:grpSp>
+      <p:sp>
+        <p:nvSpPr>
+          <p:cNvPr id="15" name="TextBox 14">
+            <a:extLst>
+              <a:ext uri="{FF2B5EF4-FFF2-40B4-BE49-F238E27FC236}">
+                <a16:creationId xmlns:a16="http://schemas.microsoft.com/office/drawing/2014/main" id="{699F7A6E-A6DB-46A4-8911-8AE307DF90DE}"/>
+              </a:ext>
+            </a:extLst>
+          </p:cNvPr>
+          <p:cNvSpPr txBox="1"/>
+          <p:nvPr/>
+        </p:nvSpPr>
+        <p:spPr>
+          <a:xfrm>
+            <a:off x="515256" y="1875780"/>
+            <a:ext cx="3570513" cy="1331428"/>
+          </a:xfrm>
+          <a:prstGeom prst="roundRect">
+            <a:avLst/>
+          </a:prstGeom>
+          <a:solidFill>
+            <a:srgbClr val="0078D7"/>
+          </a:solidFill>
+          <a:ln>
+            <a:noFill/>
+          </a:ln>
+        </p:spPr>
+        <p:style>
+          <a:lnRef idx="2">
+            <a:schemeClr val="accent4">
+              <a:shade val="50000"/>
+            </a:schemeClr>
+          </a:lnRef>
+          <a:fillRef idx="1">
+            <a:schemeClr val="accent4"/>
+          </a:fillRef>
+          <a:effectRef idx="0">
+            <a:schemeClr val="accent4"/>
+          </a:effectRef>
+          <a:fontRef idx="minor">
+            <a:schemeClr val="lt1"/>
+          </a:fontRef>
+        </p:style>
+        <p:txBody>
+          <a:bodyPr wrap="square" lIns="182880" tIns="146304" rIns="182880" bIns="146304" rtlCol="0">
+            <a:spAutoFit/>
+          </a:bodyPr>
+          <a:lstStyle/>
+          <a:p>
+            <a:pPr>
+              <a:lnSpc>
+                <a:spcPct val="90000"/>
+              </a:lnSpc>
+              <a:spcAft>
+                <a:spcPts val="600"/>
+              </a:spcAft>
+            </a:pPr>
+            <a:r>
+              <a:rPr lang="sv-SE" sz="2000" b="1" dirty="0">
+                <a:gradFill>
+                  <a:gsLst>
+                    <a:gs pos="2917">
+                      <a:schemeClr val="tx1"/>
+                    </a:gs>
+                    <a:gs pos="30000">
+                      <a:schemeClr val="tx1"/>
+                    </a:gs>
+                  </a:gsLst>
+                  <a:lin ang="5400000" scaled="0"/>
+                </a:gradFill>
+                <a:latin typeface="Segoe UI" panose="020B0502040204020203" pitchFamily="34" charset="0"/>
+                <a:cs typeface="Segoe UI" panose="020B0502040204020203" pitchFamily="34" charset="0"/>
+              </a:rPr>
+              <a:t>Page 3 &gt; Task 3 &gt; Step 8</a:t>
+            </a:r>
+          </a:p>
+          <a:p>
+            <a:pPr>
+              <a:lnSpc>
+                <a:spcPct val="90000"/>
+              </a:lnSpc>
+              <a:spcAft>
+                <a:spcPts val="600"/>
+              </a:spcAft>
+            </a:pPr>
+            <a:r>
+              <a:rPr lang="sv-SE" sz="2000" dirty="0">
+                <a:gradFill>
+                  <a:gsLst>
+                    <a:gs pos="2917">
+                      <a:schemeClr val="tx1"/>
+                    </a:gs>
+                    <a:gs pos="30000">
+                      <a:schemeClr val="tx1"/>
+                    </a:gs>
+                  </a:gsLst>
+                  <a:lin ang="5400000" scaled="0"/>
+                </a:gradFill>
+              </a:rPr>
+              <a:t>Connection string already correct</a:t>
+            </a:r>
+          </a:p>
+        </p:txBody>
+      </p:sp>
+      <p:sp>
+        <p:nvSpPr>
+          <p:cNvPr id="16" name="TextBox 15">
+            <a:extLst>
+              <a:ext uri="{FF2B5EF4-FFF2-40B4-BE49-F238E27FC236}">
+                <a16:creationId xmlns:a16="http://schemas.microsoft.com/office/drawing/2014/main" id="{87664D40-E429-483D-BF53-846E8E716523}"/>
+              </a:ext>
+            </a:extLst>
+          </p:cNvPr>
+          <p:cNvSpPr txBox="1"/>
+          <p:nvPr/>
+        </p:nvSpPr>
+        <p:spPr>
+          <a:xfrm>
+            <a:off x="515255" y="3350226"/>
+            <a:ext cx="3570513" cy="1331428"/>
+          </a:xfrm>
+          <a:prstGeom prst="roundRect">
+            <a:avLst/>
+          </a:prstGeom>
+          <a:solidFill>
+            <a:srgbClr val="0078D7"/>
+          </a:solidFill>
+          <a:ln>
+            <a:noFill/>
+          </a:ln>
+        </p:spPr>
+        <p:style>
+          <a:lnRef idx="2">
+            <a:schemeClr val="accent4">
+              <a:shade val="50000"/>
+            </a:schemeClr>
+          </a:lnRef>
+          <a:fillRef idx="1">
+            <a:schemeClr val="accent4"/>
+          </a:fillRef>
+          <a:effectRef idx="0">
+            <a:schemeClr val="accent4"/>
+          </a:effectRef>
+          <a:fontRef idx="minor">
+            <a:schemeClr val="lt1"/>
+          </a:fontRef>
+        </p:style>
+        <p:txBody>
+          <a:bodyPr wrap="square" lIns="182880" tIns="146304" rIns="182880" bIns="146304" rtlCol="0">
+            <a:spAutoFit/>
+          </a:bodyPr>
+          <a:lstStyle/>
+          <a:p>
+            <a:pPr>
+              <a:lnSpc>
+                <a:spcPct val="90000"/>
+              </a:lnSpc>
+              <a:spcAft>
+                <a:spcPts val="600"/>
+              </a:spcAft>
+            </a:pPr>
+            <a:r>
+              <a:rPr lang="sv-SE" sz="2000" b="1" dirty="0">
+                <a:gradFill>
+                  <a:gsLst>
+                    <a:gs pos="2917">
+                      <a:schemeClr val="tx1"/>
+                    </a:gs>
+                    <a:gs pos="30000">
+                      <a:schemeClr val="tx1"/>
+                    </a:gs>
+                  </a:gsLst>
+                  <a:lin ang="5400000" scaled="0"/>
+                </a:gradFill>
+                <a:latin typeface="Segoe UI" panose="020B0502040204020203" pitchFamily="34" charset="0"/>
+                <a:cs typeface="Segoe UI" panose="020B0502040204020203" pitchFamily="34" charset="0"/>
+              </a:rPr>
+              <a:t>Page 6 &gt; Task 3 &gt; Step 11</a:t>
+            </a:r>
+          </a:p>
+          <a:p>
+            <a:pPr>
+              <a:lnSpc>
+                <a:spcPct val="90000"/>
+              </a:lnSpc>
+              <a:spcAft>
+                <a:spcPts val="600"/>
+              </a:spcAft>
+            </a:pPr>
+            <a:r>
+              <a:rPr lang="sv-SE" sz="2000" dirty="0">
+                <a:gradFill>
+                  <a:gsLst>
+                    <a:gs pos="2917">
+                      <a:schemeClr val="tx1"/>
+                    </a:gs>
+                    <a:gs pos="30000">
+                      <a:schemeClr val="tx1"/>
+                    </a:gs>
+                  </a:gsLst>
+                  <a:lin ang="5400000" scaled="0"/>
+                </a:gradFill>
+              </a:rPr>
+              <a:t>Delete existing replica-set to trigger re-deploy</a:t>
+            </a:r>
+          </a:p>
+        </p:txBody>
+      </p:sp>
+      <p:sp>
+        <p:nvSpPr>
+          <p:cNvPr id="17" name="TextBox 16">
+            <a:extLst>
+              <a:ext uri="{FF2B5EF4-FFF2-40B4-BE49-F238E27FC236}">
+                <a16:creationId xmlns:a16="http://schemas.microsoft.com/office/drawing/2014/main" id="{85379AFB-522E-44FA-8543-45E7533B6346}"/>
+              </a:ext>
+            </a:extLst>
+          </p:cNvPr>
+          <p:cNvSpPr txBox="1"/>
+          <p:nvPr/>
+        </p:nvSpPr>
+        <p:spPr>
+          <a:xfrm>
+            <a:off x="4489010" y="4048259"/>
+            <a:ext cx="3551850" cy="2359795"/>
+          </a:xfrm>
+          <a:prstGeom prst="roundRect">
+            <a:avLst/>
+          </a:prstGeom>
+          <a:solidFill>
+            <a:srgbClr val="0078D7"/>
+          </a:solidFill>
+          <a:ln>
+            <a:noFill/>
+          </a:ln>
+        </p:spPr>
+        <p:style>
+          <a:lnRef idx="2">
+            <a:schemeClr val="accent4">
+              <a:shade val="50000"/>
+            </a:schemeClr>
+          </a:lnRef>
+          <a:fillRef idx="1">
+            <a:schemeClr val="accent4"/>
+          </a:fillRef>
+          <a:effectRef idx="0">
+            <a:schemeClr val="accent4"/>
+          </a:effectRef>
+          <a:fontRef idx="minor">
+            <a:schemeClr val="lt1"/>
+          </a:fontRef>
+        </p:style>
+        <p:txBody>
+          <a:bodyPr wrap="square" lIns="182880" tIns="146304" rIns="182880" bIns="146304" rtlCol="0">
+            <a:spAutoFit/>
+          </a:bodyPr>
+          <a:lstStyle/>
+          <a:p>
+            <a:pPr>
+              <a:lnSpc>
+                <a:spcPct val="90000"/>
+              </a:lnSpc>
+              <a:spcAft>
+                <a:spcPts val="600"/>
+              </a:spcAft>
+            </a:pPr>
+            <a:r>
+              <a:rPr lang="sv-SE" sz="2000" b="1" dirty="0">
+                <a:gradFill>
+                  <a:gsLst>
+                    <a:gs pos="2917">
+                      <a:schemeClr val="tx1"/>
+                    </a:gs>
+                    <a:gs pos="30000">
+                      <a:schemeClr val="tx1"/>
+                    </a:gs>
+                  </a:gsLst>
+                  <a:lin ang="5400000" scaled="0"/>
+                </a:gradFill>
+                <a:latin typeface="Segoe UI" panose="020B0502040204020203" pitchFamily="34" charset="0"/>
+                <a:cs typeface="Segoe UI" panose="020B0502040204020203" pitchFamily="34" charset="0"/>
+              </a:rPr>
+              <a:t>Page 6 &gt; Task 3 &gt; Step 4</a:t>
+            </a:r>
+          </a:p>
+          <a:p>
+            <a:pPr>
+              <a:lnSpc>
+                <a:spcPct val="90000"/>
+              </a:lnSpc>
+              <a:spcAft>
+                <a:spcPts val="600"/>
+              </a:spcAft>
+            </a:pPr>
+            <a:r>
+              <a:rPr lang="en-US" sz="1600" strike="sngStrike" dirty="0" err="1">
+                <a:ea typeface="Segoe UI Black" panose="020B0A02040204020203" pitchFamily="34" charset="0"/>
+              </a:rPr>
+              <a:t>npm</a:t>
+            </a:r>
+            <a:r>
+              <a:rPr lang="en-US" sz="1600" strike="sngStrike" dirty="0">
+                <a:ea typeface="Segoe UI Black" panose="020B0A02040204020203" pitchFamily="34" charset="0"/>
+              </a:rPr>
+              <a:t> </a:t>
+            </a:r>
+            <a:r>
+              <a:rPr lang="en-US" sz="1600" strike="sngStrike" dirty="0" err="1">
+                <a:ea typeface="Segoe UI Black" panose="020B0A02040204020203" pitchFamily="34" charset="0"/>
+              </a:rPr>
+              <a:t>i</a:t>
+            </a:r>
+            <a:r>
+              <a:rPr lang="en-US" sz="1600" strike="sngStrike" dirty="0">
+                <a:ea typeface="Segoe UI Black" panose="020B0A02040204020203" pitchFamily="34" charset="0"/>
+              </a:rPr>
+              <a:t> </a:t>
+            </a:r>
+            <a:r>
+              <a:rPr lang="en-US" sz="1600" strike="sngStrike" dirty="0" err="1">
+                <a:ea typeface="Segoe UI Black" panose="020B0A02040204020203" pitchFamily="34" charset="0"/>
+              </a:rPr>
+              <a:t>applicationinsights</a:t>
+            </a:r>
+            <a:endParaRPr lang="en-US" sz="1600" strike="sngStrike" dirty="0">
+              <a:ea typeface="Segoe UI Black" panose="020B0A02040204020203" pitchFamily="34" charset="0"/>
+            </a:endParaRPr>
+          </a:p>
+          <a:p>
+            <a:pPr>
+              <a:lnSpc>
+                <a:spcPct val="90000"/>
+              </a:lnSpc>
+              <a:spcAft>
+                <a:spcPts val="600"/>
+              </a:spcAft>
+            </a:pPr>
+            <a:r>
+              <a:rPr lang="sv-SE" sz="1600" b="1" i="1" dirty="0">
+                <a:gradFill>
+                  <a:gsLst>
+                    <a:gs pos="2917">
+                      <a:schemeClr val="tx1"/>
+                    </a:gs>
+                    <a:gs pos="30000">
+                      <a:schemeClr val="tx1"/>
+                    </a:gs>
+                  </a:gsLst>
+                  <a:lin ang="5400000" scaled="0"/>
+                </a:gradFill>
+              </a:rPr>
+              <a:t>Edit package.json:</a:t>
+            </a:r>
+          </a:p>
+          <a:p>
+            <a:pPr>
+              <a:lnSpc>
+                <a:spcPct val="90000"/>
+              </a:lnSpc>
+              <a:spcAft>
+                <a:spcPts val="600"/>
+              </a:spcAft>
+            </a:pPr>
+            <a:r>
+              <a:rPr lang="en-US" sz="1600" b="1" dirty="0">
+                <a:latin typeface="+mj-lt"/>
+                <a:ea typeface="Segoe UI Black" panose="020B0A02040204020203" pitchFamily="34" charset="0"/>
+              </a:rPr>
+              <a:t>"dependencies": {</a:t>
+            </a:r>
+            <a:br>
+              <a:rPr lang="en-US" sz="1600" b="1" dirty="0">
+                <a:latin typeface="+mj-lt"/>
+                <a:ea typeface="Segoe UI Black" panose="020B0A02040204020203" pitchFamily="34" charset="0"/>
+              </a:rPr>
+            </a:br>
+            <a:r>
+              <a:rPr lang="en-US" sz="1600" b="1" dirty="0">
+                <a:latin typeface="+mj-lt"/>
+                <a:ea typeface="Segoe UI Black" panose="020B0A02040204020203" pitchFamily="34" charset="0"/>
+              </a:rPr>
+              <a:t>    "</a:t>
+            </a:r>
+            <a:r>
+              <a:rPr lang="en-US" sz="1600" b="1" dirty="0" err="1">
+                <a:latin typeface="+mj-lt"/>
+                <a:ea typeface="Segoe UI Black" panose="020B0A02040204020203" pitchFamily="34" charset="0"/>
+              </a:rPr>
+              <a:t>applicationinsights</a:t>
+            </a:r>
+            <a:r>
+              <a:rPr lang="en-US" sz="1600" b="1" dirty="0">
+                <a:latin typeface="+mj-lt"/>
+                <a:ea typeface="Segoe UI Black" panose="020B0A02040204020203" pitchFamily="34" charset="0"/>
+              </a:rPr>
+              <a:t>": "^2.1.7",</a:t>
+            </a:r>
+            <a:br>
+              <a:rPr lang="en-US" sz="1600" b="1" dirty="0">
+                <a:latin typeface="+mj-lt"/>
+                <a:ea typeface="Segoe UI Black" panose="020B0A02040204020203" pitchFamily="34" charset="0"/>
+              </a:rPr>
+            </a:br>
+            <a:r>
+              <a:rPr lang="en-US" sz="1600" b="1" dirty="0">
+                <a:latin typeface="+mj-lt"/>
+                <a:ea typeface="Segoe UI Black" panose="020B0A02040204020203" pitchFamily="34" charset="0"/>
+              </a:rPr>
+              <a:t>   …</a:t>
+            </a:r>
+            <a:br>
+              <a:rPr lang="en-US" sz="1600" b="1" dirty="0">
+                <a:latin typeface="+mj-lt"/>
+                <a:ea typeface="Segoe UI Black" panose="020B0A02040204020203" pitchFamily="34" charset="0"/>
+              </a:rPr>
+            </a:br>
+            <a:r>
+              <a:rPr lang="en-US" sz="1600" b="1" dirty="0">
+                <a:latin typeface="+mj-lt"/>
+                <a:ea typeface="Segoe UI Black" panose="020B0A02040204020203" pitchFamily="34" charset="0"/>
+              </a:rPr>
+              <a:t>}</a:t>
+            </a:r>
+            <a:endParaRPr lang="sv-SE" sz="1600" dirty="0">
+              <a:gradFill>
+                <a:gsLst>
+                  <a:gs pos="2917">
+                    <a:schemeClr val="tx1"/>
+                  </a:gs>
+                  <a:gs pos="30000">
+                    <a:schemeClr val="tx1"/>
+                  </a:gs>
+                </a:gsLst>
+                <a:lin ang="5400000" scaled="0"/>
+              </a:gradFill>
+              <a:latin typeface="+mj-lt"/>
+            </a:endParaRPr>
           </a:p>
         </p:txBody>
       </p:sp>

</xml_diff>

<commit_message>
Updated is to are
</commit_message>
<xml_diff>
--- a/AIW Cloud Native.pptx
+++ b/AIW Cloud Native.pptx
@@ -253,7 +253,7 @@
           <a:p>
             <a:fld id="{52A13B17-C506-4D51-BB37-16B365906619}" type="datetimeFigureOut">
               <a:rPr lang="en-US" smtClean="0"/>
-              <a:t>9/27/2021</a:t>
+              <a:t>9/28/2021</a:t>
             </a:fld>
             <a:endParaRPr lang="en-US" dirty="0"/>
           </a:p>
@@ -4128,7 +4128,7 @@
                   <a:prstClr val="black"/>
                 </a:solidFill>
               </a:rPr>
-              <a:t>9/27/2021 2:43 PM</a:t>
+              <a:t>9/28/2021 8:13 AM</a:t>
             </a:fld>
             <a:endParaRPr lang="en-US" dirty="0">
               <a:solidFill>
@@ -17132,8 +17132,20 @@
           <a:p>
             <a:pPr algn="ctr"/>
             <a:r>
+              <a:rPr lang="sv-SE" b="1" dirty="0" err="1"/>
+              <a:t>Who</a:t>
+            </a:r>
+            <a:r>
               <a:rPr lang="sv-SE" b="1" dirty="0"/>
-              <a:t>Who is already using </a:t>
+              <a:t> </a:t>
+            </a:r>
+            <a:r>
+              <a:rPr lang="sv-SE" b="1" dirty="0" err="1"/>
+              <a:t>are</a:t>
+            </a:r>
+            <a:r>
+              <a:rPr lang="sv-SE" b="1" dirty="0"/>
+              <a:t> already using </a:t>
             </a:r>
             <a:br>
               <a:rPr lang="sv-SE" b="1" dirty="0"/>
@@ -17207,8 +17219,20 @@
           <a:p>
             <a:pPr algn="ctr"/>
             <a:r>
+              <a:rPr lang="sv-SE" b="1" dirty="0" err="1"/>
+              <a:t>Who</a:t>
+            </a:r>
+            <a:r>
               <a:rPr lang="sv-SE" b="1" dirty="0"/>
-              <a:t>Who is already familiar </a:t>
+              <a:t> </a:t>
+            </a:r>
+            <a:r>
+              <a:rPr lang="sv-SE" b="1" dirty="0" err="1"/>
+              <a:t>are</a:t>
+            </a:r>
+            <a:r>
+              <a:rPr lang="sv-SE" b="1" dirty="0"/>
+              <a:t> already familiar </a:t>
             </a:r>
             <a:br>
               <a:rPr lang="sv-SE" b="1" dirty="0"/>
@@ -17282,8 +17306,20 @@
           <a:p>
             <a:pPr algn="ctr"/>
             <a:r>
+              <a:rPr lang="sv-SE" b="1" dirty="0" err="1"/>
+              <a:t>Who</a:t>
+            </a:r>
+            <a:r>
               <a:rPr lang="sv-SE" b="1" dirty="0"/>
-              <a:t>Who is already running containers for </a:t>
+              <a:t> </a:t>
+            </a:r>
+            <a:r>
+              <a:rPr lang="sv-SE" b="1" dirty="0" err="1"/>
+              <a:t>are</a:t>
+            </a:r>
+            <a:r>
+              <a:rPr lang="sv-SE" b="1" dirty="0"/>
+              <a:t> already running containers for </a:t>
             </a:r>
             <a:r>
               <a:rPr lang="sv-SE" b="1" dirty="0">
@@ -17361,8 +17397,20 @@
           <a:p>
             <a:pPr algn="ctr"/>
             <a:r>
+              <a:rPr lang="sv-SE" b="1" dirty="0" err="1"/>
+              <a:t>Who</a:t>
+            </a:r>
+            <a:r>
               <a:rPr lang="sv-SE" b="1" dirty="0"/>
-              <a:t>Who is already running containers for </a:t>
+              <a:t> </a:t>
+            </a:r>
+            <a:r>
+              <a:rPr lang="sv-SE" b="1" dirty="0" err="1"/>
+              <a:t>are</a:t>
+            </a:r>
+            <a:r>
+              <a:rPr lang="sv-SE" b="1" dirty="0"/>
+              <a:t> already running containers for </a:t>
             </a:r>
             <a:r>
               <a:rPr lang="sv-SE" b="1" dirty="0">
@@ -17440,8 +17488,20 @@
           <a:p>
             <a:pPr algn="ctr"/>
             <a:r>
+              <a:rPr lang="sv-SE" b="1" dirty="0" err="1"/>
+              <a:t>Who</a:t>
+            </a:r>
+            <a:r>
               <a:rPr lang="sv-SE" b="1" dirty="0"/>
-              <a:t>Who is planning to move to, or develop a cloud native solution?</a:t>
+              <a:t> </a:t>
+            </a:r>
+            <a:r>
+              <a:rPr lang="sv-SE" b="1" dirty="0" err="1"/>
+              <a:t>are</a:t>
+            </a:r>
+            <a:r>
+              <a:rPr lang="sv-SE" b="1" dirty="0"/>
+              <a:t> planning to move to, or develop a cloud native solution?</a:t>
             </a:r>
             <a:endParaRPr lang="sv-SE" dirty="0"/>
           </a:p>

</xml_diff>